<commit_message>
Large amend to informatics-related stuff for spring semester
git-svn-id: https://svn.code.sf.net/p/cpp-lects-rus/code/trunk@374 39143b06-f351-456c-9f92-4cd32fad6823
</commit_message>
<xml_diff>
--- a/other_lects/informatics/04b-variadic.pptx
+++ b/other_lects/informatics/04b-variadic.pptx
@@ -16,6 +16,10 @@
     <p:sldId id="263" r:id="rId10"/>
     <p:sldId id="269" r:id="rId11"/>
     <p:sldId id="270" r:id="rId12"/>
+    <p:sldId id="271" r:id="rId13"/>
+    <p:sldId id="272" r:id="rId14"/>
+    <p:sldId id="273" r:id="rId15"/>
+    <p:sldId id="274" r:id="rId16"/>
   </p:sldIdLst>
   <p:sldSz cx="12192000" cy="6858000"/>
   <p:notesSz cx="6858000" cy="9144000"/>
@@ -319,7 +323,7 @@
             <a:fld id="{96DFF08F-DC6B-4601-B491-B0F83F6DD2DA}" type="datetimeFigureOut">
               <a:rPr lang="en-US" dirty="0"/>
               <a:pPr/>
-              <a:t>12/29/2019</a:t>
+              <a:t>1/1/2020</a:t>
             </a:fld>
             <a:endParaRPr lang="en-US" dirty="0"/>
           </a:p>
@@ -536,7 +540,7 @@
           <a:p>
             <a:fld id="{96DFF08F-DC6B-4601-B491-B0F83F6DD2DA}" type="datetimeFigureOut">
               <a:rPr lang="en-US" dirty="0"/>
-              <a:t>12/29/2019</a:t>
+              <a:t>1/1/2020</a:t>
             </a:fld>
             <a:endParaRPr lang="en-US" dirty="0"/>
           </a:p>
@@ -711,7 +715,7 @@
           <a:p>
             <a:fld id="{96DFF08F-DC6B-4601-B491-B0F83F6DD2DA}" type="datetimeFigureOut">
               <a:rPr lang="en-US" dirty="0"/>
-              <a:t>12/29/2019</a:t>
+              <a:t>1/1/2020</a:t>
             </a:fld>
             <a:endParaRPr lang="en-US" dirty="0"/>
           </a:p>
@@ -876,7 +880,7 @@
           <a:p>
             <a:fld id="{96DFF08F-DC6B-4601-B491-B0F83F6DD2DA}" type="datetimeFigureOut">
               <a:rPr lang="en-US" dirty="0"/>
-              <a:t>12/29/2019</a:t>
+              <a:t>1/1/2020</a:t>
             </a:fld>
             <a:endParaRPr lang="en-US" dirty="0"/>
           </a:p>
@@ -1122,7 +1126,7 @@
           <a:p>
             <a:fld id="{96DFF08F-DC6B-4601-B491-B0F83F6DD2DA}" type="datetimeFigureOut">
               <a:rPr lang="en-US" dirty="0"/>
-              <a:t>12/29/2019</a:t>
+              <a:t>1/1/2020</a:t>
             </a:fld>
             <a:endParaRPr lang="en-US" dirty="0"/>
           </a:p>
@@ -1440,7 +1444,7 @@
           <a:p>
             <a:fld id="{96DFF08F-DC6B-4601-B491-B0F83F6DD2DA}" type="datetimeFigureOut">
               <a:rPr lang="en-US" dirty="0"/>
-              <a:t>12/29/2019</a:t>
+              <a:t>1/1/2020</a:t>
             </a:fld>
             <a:endParaRPr lang="en-US" dirty="0"/>
           </a:p>
@@ -1859,7 +1863,7 @@
           <a:p>
             <a:fld id="{96DFF08F-DC6B-4601-B491-B0F83F6DD2DA}" type="datetimeFigureOut">
               <a:rPr lang="en-US" dirty="0"/>
-              <a:t>12/29/2019</a:t>
+              <a:t>1/1/2020</a:t>
             </a:fld>
             <a:endParaRPr lang="en-US" dirty="0"/>
           </a:p>
@@ -1972,7 +1976,7 @@
           <a:p>
             <a:fld id="{96DFF08F-DC6B-4601-B491-B0F83F6DD2DA}" type="datetimeFigureOut">
               <a:rPr lang="en-US" dirty="0"/>
-              <a:t>12/29/2019</a:t>
+              <a:t>1/1/2020</a:t>
             </a:fld>
             <a:endParaRPr lang="en-US" dirty="0"/>
           </a:p>
@@ -2062,7 +2066,7 @@
           <a:p>
             <a:fld id="{96DFF08F-DC6B-4601-B491-B0F83F6DD2DA}" type="datetimeFigureOut">
               <a:rPr lang="en-US" dirty="0"/>
-              <a:t>12/29/2019</a:t>
+              <a:t>1/1/2020</a:t>
             </a:fld>
             <a:endParaRPr lang="en-US" dirty="0"/>
           </a:p>
@@ -2347,7 +2351,7 @@
           <a:p>
             <a:fld id="{96DFF08F-DC6B-4601-B491-B0F83F6DD2DA}" type="datetimeFigureOut">
               <a:rPr lang="en-US" dirty="0"/>
-              <a:t>12/29/2019</a:t>
+              <a:t>1/1/2020</a:t>
             </a:fld>
             <a:endParaRPr lang="en-US" dirty="0"/>
           </a:p>
@@ -2614,7 +2618,7 @@
           <a:p>
             <a:fld id="{96DFF08F-DC6B-4601-B491-B0F83F6DD2DA}" type="datetimeFigureOut">
               <a:rPr lang="en-US" dirty="0"/>
-              <a:t>12/29/2019</a:t>
+              <a:t>1/1/2020</a:t>
             </a:fld>
             <a:endParaRPr lang="en-US" dirty="0"/>
           </a:p>
@@ -2863,7 +2867,7 @@
             <a:fld id="{96DFF08F-DC6B-4601-B491-B0F83F6DD2DA}" type="datetimeFigureOut">
               <a:rPr lang="en-US" dirty="0"/>
               <a:pPr/>
-              <a:t>12/29/2019</a:t>
+              <a:t>1/1/2020</a:t>
             </a:fld>
             <a:endParaRPr lang="en-US" dirty="0"/>
           </a:p>
@@ -3365,8 +3369,8 @@
           </a:p>
         </p:txBody>
       </p:sp>
-      <mc:AlternateContent xmlns:mc="http://schemas.openxmlformats.org/markup-compatibility/2006">
-        <mc:Choice xmlns:a14="http://schemas.microsoft.com/office/drawing/2010/main" Requires="a14">
+      <mc:AlternateContent xmlns:mc="http://schemas.openxmlformats.org/markup-compatibility/2006" xmlns:a14="http://schemas.microsoft.com/office/drawing/2010/main">
+        <mc:Choice Requires="a14">
           <p:sp>
             <p:nvSpPr>
               <p:cNvPr id="4" name="Subtitle 2"/>
@@ -3653,7 +3657,7 @@
             </p:txBody>
           </p:sp>
         </mc:Choice>
-        <mc:Fallback>
+        <mc:Fallback xmlns="">
           <p:sp>
             <p:nvSpPr>
               <p:cNvPr id="4" name="Subtitle 2"/>
@@ -4109,6 +4113,905 @@
     <p:extLst>
       <p:ext uri="{BB962C8B-B14F-4D97-AF65-F5344CB8AC3E}">
         <p14:creationId xmlns:p14="http://schemas.microsoft.com/office/powerpoint/2010/main" val="15062877"/>
+      </p:ext>
+    </p:extLst>
+  </p:cSld>
+  <p:clrMapOvr>
+    <a:masterClrMapping/>
+  </p:clrMapOvr>
+</p:sld>
+</file>
+
+<file path=ppt/slides/slide12.xml><?xml version="1.0" encoding="utf-8"?>
+<p:sld xmlns:a="http://schemas.openxmlformats.org/drawingml/2006/main" xmlns:r="http://schemas.openxmlformats.org/officeDocument/2006/relationships" xmlns:p="http://schemas.openxmlformats.org/presentationml/2006/main">
+  <p:cSld>
+    <p:spTree>
+      <p:nvGrpSpPr>
+        <p:cNvPr id="1" name=""/>
+        <p:cNvGrpSpPr/>
+        <p:nvPr/>
+      </p:nvGrpSpPr>
+      <p:grpSpPr>
+        <a:xfrm>
+          <a:off x="0" y="0"/>
+          <a:ext cx="0" cy="0"/>
+          <a:chOff x="0" y="0"/>
+          <a:chExt cx="0" cy="0"/>
+        </a:xfrm>
+      </p:grpSpPr>
+      <p:sp>
+        <p:nvSpPr>
+          <p:cNvPr id="2" name="Title 1">
+            <a:extLst>
+              <a:ext uri="{FF2B5EF4-FFF2-40B4-BE49-F238E27FC236}">
+                <a16:creationId xmlns:a16="http://schemas.microsoft.com/office/drawing/2014/main" id="{DCFA9543-BF26-42F7-BEFD-AD65B47DFE25}"/>
+              </a:ext>
+            </a:extLst>
+          </p:cNvPr>
+          <p:cNvSpPr>
+            <a:spLocks noGrp="1"/>
+          </p:cNvSpPr>
+          <p:nvPr>
+            <p:ph type="title"/>
+          </p:nvPr>
+        </p:nvSpPr>
+        <p:spPr/>
+        <p:txBody>
+          <a:bodyPr/>
+          <a:lstStyle/>
+          <a:p>
+            <a:r>
+              <a:rPr lang="ru-RU"/>
+              <a:t>Обсуждение</a:t>
+            </a:r>
+          </a:p>
+        </p:txBody>
+      </p:sp>
+      <p:sp>
+        <p:nvSpPr>
+          <p:cNvPr id="3" name="Content Placeholder 2">
+            <a:extLst>
+              <a:ext uri="{FF2B5EF4-FFF2-40B4-BE49-F238E27FC236}">
+                <a16:creationId xmlns:a16="http://schemas.microsoft.com/office/drawing/2014/main" id="{9F69B36C-E89D-4825-8D67-AF39F6FBA37B}"/>
+              </a:ext>
+            </a:extLst>
+          </p:cNvPr>
+          <p:cNvSpPr>
+            <a:spLocks noGrp="1"/>
+          </p:cNvSpPr>
+          <p:nvPr>
+            <p:ph idx="1"/>
+          </p:nvPr>
+        </p:nvSpPr>
+        <p:spPr/>
+        <p:txBody>
+          <a:bodyPr/>
+          <a:lstStyle/>
+          <a:p>
+            <a:r>
+              <a:rPr lang="ru-RU"/>
+              <a:t>Можем ли мы имея </a:t>
+            </a:r>
+            <a:r>
+              <a:rPr lang="en-US"/>
+              <a:t>fprintf </a:t>
+            </a:r>
+            <a:r>
+              <a:rPr lang="ru-RU"/>
+              <a:t>написать </a:t>
+            </a:r>
+            <a:r>
+              <a:rPr lang="en-US"/>
+              <a:t>printf?</a:t>
+            </a:r>
+          </a:p>
+          <a:p>
+            <a:pPr marL="45720" indent="0">
+              <a:buNone/>
+            </a:pPr>
+            <a:r>
+              <a:rPr lang="en-US">
+                <a:latin typeface="Consolas" panose="020B0609020204030204" pitchFamily="49" charset="0"/>
+              </a:rPr>
+              <a:t>int printf(const char *format, ...)</a:t>
+            </a:r>
+            <a:r>
+              <a:rPr lang="ru-RU">
+                <a:latin typeface="Consolas" panose="020B0609020204030204" pitchFamily="49" charset="0"/>
+              </a:rPr>
+              <a:t> </a:t>
+            </a:r>
+            <a:r>
+              <a:rPr lang="en-US">
+                <a:latin typeface="Consolas" panose="020B0609020204030204" pitchFamily="49" charset="0"/>
+              </a:rPr>
+              <a:t>{</a:t>
+            </a:r>
+            <a:br>
+              <a:rPr lang="en-US">
+                <a:latin typeface="Consolas" panose="020B0609020204030204" pitchFamily="49" charset="0"/>
+              </a:rPr>
+            </a:br>
+            <a:r>
+              <a:rPr lang="en-US">
+                <a:latin typeface="Consolas" panose="020B0609020204030204" pitchFamily="49" charset="0"/>
+              </a:rPr>
+              <a:t>  </a:t>
+            </a:r>
+            <a:r>
+              <a:rPr lang="en-US">
+                <a:solidFill>
+                  <a:schemeClr val="bg1">
+                    <a:lumMod val="50000"/>
+                  </a:schemeClr>
+                </a:solidFill>
+                <a:latin typeface="Consolas" panose="020B0609020204030204" pitchFamily="49" charset="0"/>
+              </a:rPr>
+              <a:t>// </a:t>
+            </a:r>
+            <a:r>
+              <a:rPr lang="ru-RU">
+                <a:solidFill>
+                  <a:schemeClr val="bg1">
+                    <a:lumMod val="50000"/>
+                  </a:schemeClr>
+                </a:solidFill>
+                <a:latin typeface="Consolas" panose="020B0609020204030204" pitchFamily="49" charset="0"/>
+              </a:rPr>
+              <a:t>как-то вызвать </a:t>
+            </a:r>
+            <a:r>
+              <a:rPr lang="en-US">
+                <a:solidFill>
+                  <a:schemeClr val="bg1">
+                    <a:lumMod val="50000"/>
+                  </a:schemeClr>
+                </a:solidFill>
+                <a:latin typeface="Consolas" panose="020B0609020204030204" pitchFamily="49" charset="0"/>
+              </a:rPr>
+              <a:t>fprintf</a:t>
+            </a:r>
+            <a:br>
+              <a:rPr lang="en-US">
+                <a:latin typeface="Consolas" panose="020B0609020204030204" pitchFamily="49" charset="0"/>
+              </a:rPr>
+            </a:br>
+            <a:r>
+              <a:rPr lang="en-US">
+                <a:latin typeface="Consolas" panose="020B0609020204030204" pitchFamily="49" charset="0"/>
+              </a:rPr>
+              <a:t>}</a:t>
+            </a:r>
+          </a:p>
+          <a:p>
+            <a:r>
+              <a:rPr lang="ru-RU"/>
+              <a:t>Увы, в языке нет способа из функции "пробросить троеточие"</a:t>
+            </a:r>
+          </a:p>
+          <a:p>
+            <a:r>
+              <a:rPr lang="ru-RU"/>
+              <a:t>Можно написать макрос, но мы хотим избежать макросов</a:t>
+            </a:r>
+          </a:p>
+          <a:p>
+            <a:r>
+              <a:rPr lang="ru-RU"/>
+              <a:t>А что если передать </a:t>
+            </a:r>
+            <a:r>
+              <a:rPr lang="en-US"/>
+              <a:t>va_list?</a:t>
+            </a:r>
+            <a:endParaRPr lang="ru-RU"/>
+          </a:p>
+        </p:txBody>
+      </p:sp>
+    </p:spTree>
+    <p:extLst>
+      <p:ext uri="{BB962C8B-B14F-4D97-AF65-F5344CB8AC3E}">
+        <p14:creationId xmlns:p14="http://schemas.microsoft.com/office/powerpoint/2010/main" val="2748917058"/>
+      </p:ext>
+    </p:extLst>
+  </p:cSld>
+  <p:clrMapOvr>
+    <a:masterClrMapping/>
+  </p:clrMapOvr>
+</p:sld>
+</file>
+
+<file path=ppt/slides/slide13.xml><?xml version="1.0" encoding="utf-8"?>
+<p:sld xmlns:a="http://schemas.openxmlformats.org/drawingml/2006/main" xmlns:r="http://schemas.openxmlformats.org/officeDocument/2006/relationships" xmlns:p="http://schemas.openxmlformats.org/presentationml/2006/main">
+  <p:cSld>
+    <p:spTree>
+      <p:nvGrpSpPr>
+        <p:cNvPr id="1" name=""/>
+        <p:cNvGrpSpPr/>
+        <p:nvPr/>
+      </p:nvGrpSpPr>
+      <p:grpSpPr>
+        <a:xfrm>
+          <a:off x="0" y="0"/>
+          <a:ext cx="0" cy="0"/>
+          <a:chOff x="0" y="0"/>
+          <a:chExt cx="0" cy="0"/>
+        </a:xfrm>
+      </p:grpSpPr>
+      <p:sp>
+        <p:nvSpPr>
+          <p:cNvPr id="2" name="Title 1">
+            <a:extLst>
+              <a:ext uri="{FF2B5EF4-FFF2-40B4-BE49-F238E27FC236}">
+                <a16:creationId xmlns:a16="http://schemas.microsoft.com/office/drawing/2014/main" id="{DCFA9543-BF26-42F7-BEFD-AD65B47DFE25}"/>
+              </a:ext>
+            </a:extLst>
+          </p:cNvPr>
+          <p:cNvSpPr>
+            <a:spLocks noGrp="1"/>
+          </p:cNvSpPr>
+          <p:nvPr>
+            <p:ph type="title"/>
+          </p:nvPr>
+        </p:nvSpPr>
+        <p:spPr/>
+        <p:txBody>
+          <a:bodyPr/>
+          <a:lstStyle/>
+          <a:p>
+            <a:r>
+              <a:rPr lang="ru-RU"/>
+              <a:t>Волшебство </a:t>
+            </a:r>
+            <a:r>
+              <a:rPr lang="en-US"/>
+              <a:t>vfprintf</a:t>
+            </a:r>
+            <a:endParaRPr lang="ru-RU"/>
+          </a:p>
+        </p:txBody>
+      </p:sp>
+      <p:sp>
+        <p:nvSpPr>
+          <p:cNvPr id="3" name="Content Placeholder 2">
+            <a:extLst>
+              <a:ext uri="{FF2B5EF4-FFF2-40B4-BE49-F238E27FC236}">
+                <a16:creationId xmlns:a16="http://schemas.microsoft.com/office/drawing/2014/main" id="{9F69B36C-E89D-4825-8D67-AF39F6FBA37B}"/>
+              </a:ext>
+            </a:extLst>
+          </p:cNvPr>
+          <p:cNvSpPr>
+            <a:spLocks noGrp="1"/>
+          </p:cNvSpPr>
+          <p:nvPr>
+            <p:ph idx="1"/>
+          </p:nvPr>
+        </p:nvSpPr>
+        <p:spPr/>
+        <p:txBody>
+          <a:bodyPr>
+            <a:normAutofit/>
+          </a:bodyPr>
+          <a:lstStyle/>
+          <a:p>
+            <a:r>
+              <a:rPr lang="ru-RU"/>
+              <a:t>Теперь и </a:t>
+            </a:r>
+            <a:r>
+              <a:rPr lang="en-US"/>
+              <a:t>printf </a:t>
+            </a:r>
+            <a:r>
+              <a:rPr lang="ru-RU"/>
+              <a:t>и </a:t>
+            </a:r>
+            <a:r>
+              <a:rPr lang="en-US"/>
+              <a:t>fprintf </a:t>
+            </a:r>
+            <a:r>
+              <a:rPr lang="ru-RU"/>
+              <a:t>можно реализовать в терминах новой функции</a:t>
+            </a:r>
+          </a:p>
+          <a:p>
+            <a:pPr marL="45720" indent="0">
+              <a:buNone/>
+            </a:pPr>
+            <a:r>
+              <a:rPr lang="en-US">
+                <a:latin typeface="Consolas" panose="020B0609020204030204" pitchFamily="49" charset="0"/>
+              </a:rPr>
+              <a:t>int vfprintf(FILE *f, const char *format, va_list arg);</a:t>
+            </a:r>
+            <a:endParaRPr lang="ru-RU">
+              <a:latin typeface="Consolas" panose="020B0609020204030204" pitchFamily="49" charset="0"/>
+            </a:endParaRPr>
+          </a:p>
+          <a:p>
+            <a:pPr marL="45720" indent="0">
+              <a:buNone/>
+            </a:pPr>
+            <a:r>
+              <a:rPr lang="en-US">
+                <a:latin typeface="Consolas" panose="020B0609020204030204" pitchFamily="49" charset="0"/>
+              </a:rPr>
+              <a:t>int fprintf(FILE *f, const char *format, ...)</a:t>
+            </a:r>
+            <a:r>
+              <a:rPr lang="ru-RU">
+                <a:latin typeface="Consolas" panose="020B0609020204030204" pitchFamily="49" charset="0"/>
+              </a:rPr>
+              <a:t> </a:t>
+            </a:r>
+            <a:r>
+              <a:rPr lang="en-US">
+                <a:latin typeface="Consolas" panose="020B0609020204030204" pitchFamily="49" charset="0"/>
+              </a:rPr>
+              <a:t>{</a:t>
+            </a:r>
+            <a:br>
+              <a:rPr lang="en-US">
+                <a:latin typeface="Consolas" panose="020B0609020204030204" pitchFamily="49" charset="0"/>
+              </a:rPr>
+            </a:br>
+            <a:r>
+              <a:rPr lang="en-US">
+                <a:latin typeface="Consolas" panose="020B0609020204030204" pitchFamily="49" charset="0"/>
+              </a:rPr>
+              <a:t>  va_list l; int retval;</a:t>
+            </a:r>
+            <a:br>
+              <a:rPr lang="en-US">
+                <a:latin typeface="Consolas" panose="020B0609020204030204" pitchFamily="49" charset="0"/>
+              </a:rPr>
+            </a:br>
+            <a:r>
+              <a:rPr lang="en-US">
+                <a:latin typeface="Consolas" panose="020B0609020204030204" pitchFamily="49" charset="0"/>
+              </a:rPr>
+              <a:t>  va_start(l, format);</a:t>
+            </a:r>
+            <a:br>
+              <a:rPr lang="en-US">
+                <a:latin typeface="Consolas" panose="020B0609020204030204" pitchFamily="49" charset="0"/>
+              </a:rPr>
+            </a:br>
+            <a:r>
+              <a:rPr lang="en-US">
+                <a:latin typeface="Consolas" panose="020B0609020204030204" pitchFamily="49" charset="0"/>
+              </a:rPr>
+              <a:t>  retval = vfprintf(f, format, l);</a:t>
+            </a:r>
+            <a:br>
+              <a:rPr lang="en-US">
+                <a:latin typeface="Consolas" panose="020B0609020204030204" pitchFamily="49" charset="0"/>
+              </a:rPr>
+            </a:br>
+            <a:r>
+              <a:rPr lang="en-US">
+                <a:latin typeface="Consolas" panose="020B0609020204030204" pitchFamily="49" charset="0"/>
+              </a:rPr>
+              <a:t>  va_end(l);</a:t>
+            </a:r>
+            <a:br>
+              <a:rPr lang="en-US">
+                <a:latin typeface="Consolas" panose="020B0609020204030204" pitchFamily="49" charset="0"/>
+              </a:rPr>
+            </a:br>
+            <a:r>
+              <a:rPr lang="en-US">
+                <a:latin typeface="Consolas" panose="020B0609020204030204" pitchFamily="49" charset="0"/>
+              </a:rPr>
+              <a:t>  return retval;</a:t>
+            </a:r>
+            <a:br>
+              <a:rPr lang="en-US">
+                <a:latin typeface="Consolas" panose="020B0609020204030204" pitchFamily="49" charset="0"/>
+              </a:rPr>
+            </a:br>
+            <a:r>
+              <a:rPr lang="en-US">
+                <a:latin typeface="Consolas" panose="020B0609020204030204" pitchFamily="49" charset="0"/>
+              </a:rPr>
+              <a:t>}</a:t>
+            </a:r>
+          </a:p>
+          <a:p>
+            <a:pPr marL="45720" indent="0">
+              <a:buNone/>
+            </a:pPr>
+            <a:r>
+              <a:rPr lang="en-US">
+                <a:latin typeface="Consolas" panose="020B0609020204030204" pitchFamily="49" charset="0"/>
+              </a:rPr>
+              <a:t>int printf(const char *format, ...)</a:t>
+            </a:r>
+            <a:r>
+              <a:rPr lang="ru-RU">
+                <a:latin typeface="Consolas" panose="020B0609020204030204" pitchFamily="49" charset="0"/>
+              </a:rPr>
+              <a:t> </a:t>
+            </a:r>
+            <a:r>
+              <a:rPr lang="en-US">
+                <a:solidFill>
+                  <a:schemeClr val="bg1">
+                    <a:lumMod val="50000"/>
+                  </a:schemeClr>
+                </a:solidFill>
+                <a:latin typeface="Consolas" panose="020B0609020204030204" pitchFamily="49" charset="0"/>
+              </a:rPr>
+              <a:t>// </a:t>
+            </a:r>
+            <a:r>
+              <a:rPr lang="ru-RU">
+                <a:solidFill>
+                  <a:schemeClr val="bg1">
+                    <a:lumMod val="50000"/>
+                  </a:schemeClr>
+                </a:solidFill>
+                <a:latin typeface="Consolas" panose="020B0609020204030204" pitchFamily="49" charset="0"/>
+              </a:rPr>
+              <a:t>как-то вызвать </a:t>
+            </a:r>
+            <a:r>
+              <a:rPr lang="en-US">
+                <a:solidFill>
+                  <a:schemeClr val="bg1">
+                    <a:lumMod val="50000"/>
+                  </a:schemeClr>
+                </a:solidFill>
+                <a:latin typeface="Consolas" panose="020B0609020204030204" pitchFamily="49" charset="0"/>
+              </a:rPr>
+              <a:t>vfprintf</a:t>
+            </a:r>
+            <a:endParaRPr lang="en-US">
+              <a:latin typeface="Consolas" panose="020B0609020204030204" pitchFamily="49" charset="0"/>
+            </a:endParaRPr>
+          </a:p>
+        </p:txBody>
+      </p:sp>
+    </p:spTree>
+    <p:extLst>
+      <p:ext uri="{BB962C8B-B14F-4D97-AF65-F5344CB8AC3E}">
+        <p14:creationId xmlns:p14="http://schemas.microsoft.com/office/powerpoint/2010/main" val="4223972336"/>
+      </p:ext>
+    </p:extLst>
+  </p:cSld>
+  <p:clrMapOvr>
+    <a:masterClrMapping/>
+  </p:clrMapOvr>
+</p:sld>
+</file>
+
+<file path=ppt/slides/slide14.xml><?xml version="1.0" encoding="utf-8"?>
+<p:sld xmlns:a="http://schemas.openxmlformats.org/drawingml/2006/main" xmlns:r="http://schemas.openxmlformats.org/officeDocument/2006/relationships" xmlns:p="http://schemas.openxmlformats.org/presentationml/2006/main">
+  <p:cSld>
+    <p:spTree>
+      <p:nvGrpSpPr>
+        <p:cNvPr id="1" name=""/>
+        <p:cNvGrpSpPr/>
+        <p:nvPr/>
+      </p:nvGrpSpPr>
+      <p:grpSpPr>
+        <a:xfrm>
+          <a:off x="0" y="0"/>
+          <a:ext cx="0" cy="0"/>
+          <a:chOff x="0" y="0"/>
+          <a:chExt cx="0" cy="0"/>
+        </a:xfrm>
+      </p:grpSpPr>
+      <p:sp>
+        <p:nvSpPr>
+          <p:cNvPr id="2" name="Title 1">
+            <a:extLst>
+              <a:ext uri="{FF2B5EF4-FFF2-40B4-BE49-F238E27FC236}">
+                <a16:creationId xmlns:a16="http://schemas.microsoft.com/office/drawing/2014/main" id="{C61C0A65-384F-4728-8398-34A2DB249DEF}"/>
+              </a:ext>
+            </a:extLst>
+          </p:cNvPr>
+          <p:cNvSpPr>
+            <a:spLocks noGrp="1"/>
+          </p:cNvSpPr>
+          <p:nvPr>
+            <p:ph type="title"/>
+          </p:nvPr>
+        </p:nvSpPr>
+        <p:spPr/>
+        <p:txBody>
+          <a:bodyPr/>
+          <a:lstStyle/>
+          <a:p>
+            <a:r>
+              <a:rPr lang="ru-RU"/>
+              <a:t>Обсуждение</a:t>
+            </a:r>
+          </a:p>
+        </p:txBody>
+      </p:sp>
+      <p:sp>
+        <p:nvSpPr>
+          <p:cNvPr id="3" name="Content Placeholder 2">
+            <a:extLst>
+              <a:ext uri="{FF2B5EF4-FFF2-40B4-BE49-F238E27FC236}">
+                <a16:creationId xmlns:a16="http://schemas.microsoft.com/office/drawing/2014/main" id="{E1756D97-1501-4838-A3C1-86D43022DD32}"/>
+              </a:ext>
+            </a:extLst>
+          </p:cNvPr>
+          <p:cNvSpPr>
+            <a:spLocks noGrp="1"/>
+          </p:cNvSpPr>
+          <p:nvPr>
+            <p:ph idx="1"/>
+          </p:nvPr>
+        </p:nvSpPr>
+        <p:spPr/>
+        <p:txBody>
+          <a:bodyPr/>
+          <a:lstStyle/>
+          <a:p>
+            <a:r>
+              <a:rPr lang="ru-RU"/>
+              <a:t>Функции, такие как</a:t>
+            </a:r>
+            <a:r>
+              <a:rPr lang="en-US"/>
+              <a:t> vfprintf </a:t>
+            </a:r>
+            <a:r>
+              <a:rPr lang="ru-RU"/>
+              <a:t>и </a:t>
+            </a:r>
+            <a:r>
+              <a:rPr lang="en-US"/>
+              <a:t>vsprintf </a:t>
+            </a:r>
+            <a:r>
+              <a:rPr lang="ru-RU"/>
+              <a:t>очень полезны при написании собственных </a:t>
+            </a:r>
+            <a:r>
+              <a:rPr lang="en-US"/>
+              <a:t>printf-</a:t>
+            </a:r>
+            <a:r>
+              <a:rPr lang="ru-RU"/>
+              <a:t>подобных функций</a:t>
+            </a:r>
+          </a:p>
+          <a:p>
+            <a:pPr marL="45720" indent="0">
+              <a:buNone/>
+            </a:pPr>
+            <a:r>
+              <a:rPr lang="en-US">
+                <a:latin typeface="Consolas" panose="020B0609020204030204" pitchFamily="49" charset="0"/>
+              </a:rPr>
+              <a:t>pFile = fopen (szFileName,"r");</a:t>
+            </a:r>
+            <a:br>
+              <a:rPr lang="ru-RU">
+                <a:latin typeface="Consolas" panose="020B0609020204030204" pitchFamily="49" charset="0"/>
+              </a:rPr>
+            </a:br>
+            <a:r>
+              <a:rPr lang="en-US">
+                <a:latin typeface="Consolas" panose="020B0609020204030204" pitchFamily="49" charset="0"/>
+              </a:rPr>
+              <a:t>if (pFile == NULL)</a:t>
+            </a:r>
+            <a:br>
+              <a:rPr lang="ru-RU">
+                <a:latin typeface="Consolas" panose="020B0609020204030204" pitchFamily="49" charset="0"/>
+              </a:rPr>
+            </a:br>
+            <a:r>
+              <a:rPr lang="ru-RU">
+                <a:latin typeface="Consolas" panose="020B0609020204030204" pitchFamily="49" charset="0"/>
+              </a:rPr>
+              <a:t>  </a:t>
+            </a:r>
+            <a:r>
+              <a:rPr lang="en-US">
+                <a:latin typeface="Consolas" panose="020B0609020204030204" pitchFamily="49" charset="0"/>
+              </a:rPr>
+              <a:t>PrintFError("Error opening '%s'",</a:t>
+            </a:r>
+            <a:r>
+              <a:rPr lang="ru-RU">
+                <a:latin typeface="Consolas" panose="020B0609020204030204" pitchFamily="49" charset="0"/>
+              </a:rPr>
+              <a:t> </a:t>
+            </a:r>
+            <a:r>
+              <a:rPr lang="en-US">
+                <a:latin typeface="Consolas" panose="020B0609020204030204" pitchFamily="49" charset="0"/>
+              </a:rPr>
+              <a:t>szFileName);</a:t>
+            </a:r>
+            <a:endParaRPr lang="ru-RU">
+              <a:latin typeface="Consolas" panose="020B0609020204030204" pitchFamily="49" charset="0"/>
+            </a:endParaRPr>
+          </a:p>
+          <a:p>
+            <a:r>
+              <a:rPr lang="ru-RU"/>
+              <a:t>Понятно, что здесь </a:t>
+            </a:r>
+            <a:r>
+              <a:rPr lang="en-US"/>
+              <a:t>PrintFError </a:t>
+            </a:r>
+            <a:r>
+              <a:rPr lang="ru-RU"/>
+              <a:t>должна как-то вызвать внутри </a:t>
+            </a:r>
+            <a:r>
+              <a:rPr lang="en-US"/>
+              <a:t>perror, </a:t>
+            </a:r>
+            <a:r>
+              <a:rPr lang="ru-RU"/>
+              <a:t>но как её можно реализовать</a:t>
+            </a:r>
+            <a:r>
+              <a:rPr lang="en-US"/>
+              <a:t>?</a:t>
+            </a:r>
+            <a:endParaRPr lang="ru-RU"/>
+          </a:p>
+        </p:txBody>
+      </p:sp>
+    </p:spTree>
+    <p:extLst>
+      <p:ext uri="{BB962C8B-B14F-4D97-AF65-F5344CB8AC3E}">
+        <p14:creationId xmlns:p14="http://schemas.microsoft.com/office/powerpoint/2010/main" val="977827561"/>
+      </p:ext>
+    </p:extLst>
+  </p:cSld>
+  <p:clrMapOvr>
+    <a:masterClrMapping/>
+  </p:clrMapOvr>
+</p:sld>
+</file>
+
+<file path=ppt/slides/slide15.xml><?xml version="1.0" encoding="utf-8"?>
+<p:sld xmlns:a="http://schemas.openxmlformats.org/drawingml/2006/main" xmlns:r="http://schemas.openxmlformats.org/officeDocument/2006/relationships" xmlns:p="http://schemas.openxmlformats.org/presentationml/2006/main">
+  <p:cSld>
+    <p:spTree>
+      <p:nvGrpSpPr>
+        <p:cNvPr id="1" name=""/>
+        <p:cNvGrpSpPr/>
+        <p:nvPr/>
+      </p:nvGrpSpPr>
+      <p:grpSpPr>
+        <a:xfrm>
+          <a:off x="0" y="0"/>
+          <a:ext cx="0" cy="0"/>
+          <a:chOff x="0" y="0"/>
+          <a:chExt cx="0" cy="0"/>
+        </a:xfrm>
+      </p:grpSpPr>
+      <p:sp>
+        <p:nvSpPr>
+          <p:cNvPr id="2" name="Title 1">
+            <a:extLst>
+              <a:ext uri="{FF2B5EF4-FFF2-40B4-BE49-F238E27FC236}">
+                <a16:creationId xmlns:a16="http://schemas.microsoft.com/office/drawing/2014/main" id="{C61C0A65-384F-4728-8398-34A2DB249DEF}"/>
+              </a:ext>
+            </a:extLst>
+          </p:cNvPr>
+          <p:cNvSpPr>
+            <a:spLocks noGrp="1"/>
+          </p:cNvSpPr>
+          <p:nvPr>
+            <p:ph type="title"/>
+          </p:nvPr>
+        </p:nvSpPr>
+        <p:spPr/>
+        <p:txBody>
+          <a:bodyPr/>
+          <a:lstStyle/>
+          <a:p>
+            <a:r>
+              <a:rPr lang="ru-RU"/>
+              <a:t>Обсуждение</a:t>
+            </a:r>
+          </a:p>
+        </p:txBody>
+      </p:sp>
+      <p:sp>
+        <p:nvSpPr>
+          <p:cNvPr id="3" name="Content Placeholder 2">
+            <a:extLst>
+              <a:ext uri="{FF2B5EF4-FFF2-40B4-BE49-F238E27FC236}">
+                <a16:creationId xmlns:a16="http://schemas.microsoft.com/office/drawing/2014/main" id="{E1756D97-1501-4838-A3C1-86D43022DD32}"/>
+              </a:ext>
+            </a:extLst>
+          </p:cNvPr>
+          <p:cNvSpPr>
+            <a:spLocks noGrp="1"/>
+          </p:cNvSpPr>
+          <p:nvPr>
+            <p:ph idx="1"/>
+          </p:nvPr>
+        </p:nvSpPr>
+        <p:spPr>
+          <a:xfrm>
+            <a:off x="1143000" y="2057399"/>
+            <a:ext cx="9872871" cy="4667251"/>
+          </a:xfrm>
+        </p:spPr>
+        <p:txBody>
+          <a:bodyPr>
+            <a:normAutofit/>
+          </a:bodyPr>
+          <a:lstStyle/>
+          <a:p>
+            <a:r>
+              <a:rPr lang="ru-RU"/>
+              <a:t>Функции, такие как</a:t>
+            </a:r>
+            <a:r>
+              <a:rPr lang="en-US"/>
+              <a:t> vfprintf </a:t>
+            </a:r>
+            <a:r>
+              <a:rPr lang="ru-RU"/>
+              <a:t>и </a:t>
+            </a:r>
+            <a:r>
+              <a:rPr lang="en-US"/>
+              <a:t>vsprintf </a:t>
+            </a:r>
+            <a:r>
+              <a:rPr lang="ru-RU"/>
+              <a:t>очень полезны при написании собственных </a:t>
+            </a:r>
+            <a:r>
+              <a:rPr lang="en-US"/>
+              <a:t>printf-</a:t>
+            </a:r>
+            <a:r>
+              <a:rPr lang="ru-RU"/>
+              <a:t>подобных функций</a:t>
+            </a:r>
+          </a:p>
+          <a:p>
+            <a:pPr marL="45720" indent="0">
+              <a:buNone/>
+            </a:pPr>
+            <a:r>
+              <a:rPr lang="en-US">
+                <a:latin typeface="Consolas" panose="020B0609020204030204" pitchFamily="49" charset="0"/>
+              </a:rPr>
+              <a:t>void PrintFError(const char * format, ...)</a:t>
+            </a:r>
+            <a:r>
+              <a:rPr lang="ru-RU">
+                <a:latin typeface="Consolas" panose="020B0609020204030204" pitchFamily="49" charset="0"/>
+              </a:rPr>
+              <a:t> </a:t>
+            </a:r>
+            <a:r>
+              <a:rPr lang="en-US">
+                <a:latin typeface="Consolas" panose="020B0609020204030204" pitchFamily="49" charset="0"/>
+              </a:rPr>
+              <a:t>{</a:t>
+            </a:r>
+            <a:br>
+              <a:rPr lang="ru-RU">
+                <a:latin typeface="Consolas" panose="020B0609020204030204" pitchFamily="49" charset="0"/>
+              </a:rPr>
+            </a:br>
+            <a:r>
+              <a:rPr lang="en-US">
+                <a:latin typeface="Consolas" panose="020B0609020204030204" pitchFamily="49" charset="0"/>
+              </a:rPr>
+              <a:t>  char buffer[256];</a:t>
+            </a:r>
+            <a:br>
+              <a:rPr lang="ru-RU">
+                <a:latin typeface="Consolas" panose="020B0609020204030204" pitchFamily="49" charset="0"/>
+              </a:rPr>
+            </a:br>
+            <a:r>
+              <a:rPr lang="en-US">
+                <a:latin typeface="Consolas" panose="020B0609020204030204" pitchFamily="49" charset="0"/>
+              </a:rPr>
+              <a:t>  va_list args;</a:t>
+            </a:r>
+            <a:br>
+              <a:rPr lang="ru-RU">
+                <a:latin typeface="Consolas" panose="020B0609020204030204" pitchFamily="49" charset="0"/>
+              </a:rPr>
+            </a:br>
+            <a:r>
+              <a:rPr lang="en-US">
+                <a:latin typeface="Consolas" panose="020B0609020204030204" pitchFamily="49" charset="0"/>
+              </a:rPr>
+              <a:t>  va_start(args, format);</a:t>
+            </a:r>
+            <a:br>
+              <a:rPr lang="ru-RU">
+                <a:latin typeface="Consolas" panose="020B0609020204030204" pitchFamily="49" charset="0"/>
+              </a:rPr>
+            </a:br>
+            <a:r>
+              <a:rPr lang="en-US">
+                <a:latin typeface="Consolas" panose="020B0609020204030204" pitchFamily="49" charset="0"/>
+              </a:rPr>
+              <a:t>  vsprintf(buffer,format, args);</a:t>
+            </a:r>
+            <a:br>
+              <a:rPr lang="ru-RU">
+                <a:latin typeface="Consolas" panose="020B0609020204030204" pitchFamily="49" charset="0"/>
+              </a:rPr>
+            </a:br>
+            <a:r>
+              <a:rPr lang="en-US">
+                <a:latin typeface="Consolas" panose="020B0609020204030204" pitchFamily="49" charset="0"/>
+              </a:rPr>
+              <a:t>  perror(buffer);</a:t>
+            </a:r>
+            <a:br>
+              <a:rPr lang="ru-RU">
+                <a:latin typeface="Consolas" panose="020B0609020204030204" pitchFamily="49" charset="0"/>
+              </a:rPr>
+            </a:br>
+            <a:r>
+              <a:rPr lang="en-US">
+                <a:latin typeface="Consolas" panose="020B0609020204030204" pitchFamily="49" charset="0"/>
+              </a:rPr>
+              <a:t>  va_end(args);</a:t>
+            </a:r>
+            <a:br>
+              <a:rPr lang="ru-RU">
+                <a:latin typeface="Consolas" panose="020B0609020204030204" pitchFamily="49" charset="0"/>
+              </a:rPr>
+            </a:br>
+            <a:r>
+              <a:rPr lang="en-US">
+                <a:latin typeface="Consolas" panose="020B0609020204030204" pitchFamily="49" charset="0"/>
+              </a:rPr>
+              <a:t>}</a:t>
+            </a:r>
+          </a:p>
+          <a:p>
+            <a:r>
+              <a:rPr lang="ru-RU"/>
+              <a:t>Эта реализация не слишком совершенна</a:t>
+            </a:r>
+            <a:r>
+              <a:rPr lang="en-US"/>
+              <a:t> (</a:t>
+            </a:r>
+            <a:r>
+              <a:rPr lang="ru-RU"/>
+              <a:t>а что если буфер переполнится</a:t>
+            </a:r>
+            <a:r>
+              <a:rPr lang="en-US"/>
+              <a:t>?)</a:t>
+            </a:r>
+            <a:r>
+              <a:rPr lang="ru-RU"/>
+              <a:t>, но вполне обычна для языка </a:t>
+            </a:r>
+            <a:r>
+              <a:rPr lang="en-US"/>
+              <a:t>C</a:t>
+            </a:r>
+            <a:endParaRPr lang="ru-RU"/>
+          </a:p>
+        </p:txBody>
+      </p:sp>
+    </p:spTree>
+    <p:extLst>
+      <p:ext uri="{BB962C8B-B14F-4D97-AF65-F5344CB8AC3E}">
+        <p14:creationId xmlns:p14="http://schemas.microsoft.com/office/powerpoint/2010/main" val="3915632596"/>
       </p:ext>
     </p:extLst>
   </p:cSld>

</xml_diff>